<commit_message>
update formatting on seventh lesson
</commit_message>
<xml_diff>
--- a/007/lesson_7.pptx
+++ b/007/lesson_7.pptx
@@ -15737,6 +15737,9 @@
   <p:clrMapOvr>
     <a:masterClrMapping/>
   </p:clrMapOvr>
+  <p:transition>
+    <p:fade/>
+  </p:transition>
 </p:sld>
 </file>
 
@@ -16137,6 +16140,9 @@
   <p:clrMapOvr>
     <a:masterClrMapping/>
   </p:clrMapOvr>
+  <p:transition>
+    <p:fade/>
+  </p:transition>
 </p:sld>
 </file>
 
@@ -16796,6 +16802,18 @@
   <p:clrMapOvr>
     <a:masterClrMapping/>
   </p:clrMapOvr>
+  <mc:AlternateContent xmlns:mc="http://schemas.openxmlformats.org/markup-compatibility/2006">
+    <mc:Choice xmlns:p14="http://schemas.microsoft.com/office/powerpoint/2010/main" Requires="p14">
+      <p:transition p14:dur="250">
+        <p:fade/>
+      </p:transition>
+    </mc:Choice>
+    <mc:Fallback>
+      <p:transition>
+        <p:fade/>
+      </p:transition>
+    </mc:Fallback>
+  </mc:AlternateContent>
 </p:sld>
 </file>
 
@@ -17186,6 +17204,9 @@
   <p:clrMapOvr>
     <a:masterClrMapping/>
   </p:clrMapOvr>
+  <p:transition>
+    <p:fade/>
+  </p:transition>
 </p:sld>
 </file>
 
@@ -18430,6 +18451,9 @@
   <p:clrMapOvr>
     <a:masterClrMapping/>
   </p:clrMapOvr>
+  <p:transition>
+    <p:fade/>
+  </p:transition>
 </p:sld>
 </file>
 
@@ -18888,6 +18912,9 @@
   <p:clrMapOvr>
     <a:masterClrMapping/>
   </p:clrMapOvr>
+  <p:transition>
+    <p:fade/>
+  </p:transition>
 </p:sld>
 </file>
 
@@ -19140,18 +19167,9 @@
   <p:clrMapOvr>
     <a:masterClrMapping/>
   </p:clrMapOvr>
-  <mc:AlternateContent xmlns:mc="http://schemas.openxmlformats.org/markup-compatibility/2006" xmlns:p159="http://schemas.microsoft.com/office/powerpoint/2015/09/main">
-    <mc:Choice Requires="p159">
-      <p:transition spd="med">
-        <p159:morph option="byObject"/>
-      </p:transition>
-    </mc:Choice>
-    <mc:Fallback xmlns="">
-      <p:transition spd="med">
-        <p:fade/>
-      </p:transition>
-    </mc:Fallback>
-  </mc:AlternateContent>
+  <p:transition>
+    <p:fade/>
+  </p:transition>
 </p:sld>
 </file>
 
@@ -19626,6 +19644,9 @@
   <p:clrMapOvr>
     <a:masterClrMapping/>
   </p:clrMapOvr>
+  <p:transition>
+    <p:fade/>
+  </p:transition>
 </p:sld>
 </file>
 
@@ -20091,6 +20112,9 @@
   <p:clrMapOvr>
     <a:masterClrMapping/>
   </p:clrMapOvr>
+  <p:transition>
+    <p:fade/>
+  </p:transition>
 </p:sld>
 </file>
 
@@ -20671,6 +20695,9 @@
   <p:clrMapOvr>
     <a:masterClrMapping/>
   </p:clrMapOvr>
+  <p:transition>
+    <p:fade/>
+  </p:transition>
 </p:sld>
 </file>
 

</xml_diff>